<commit_message>
adds the helm chart job and pre delete job
</commit_message>
<xml_diff>
--- a/kuberise.pptx
+++ b/kuberise.pptx
@@ -8365,7 +8365,7 @@
         </p:spPr>
         <p:txBody>
           <a:bodyPr spcFirstLastPara="1" wrap="square" lIns="91425" tIns="91425" rIns="91425" bIns="91425" anchor="t" anchorCtr="0">
-            <a:normAutofit fontScale="70000" lnSpcReduction="20000"/>
+            <a:normAutofit lnSpcReduction="10000"/>
           </a:bodyPr>
           <a:lstStyle/>
           <a:p>
@@ -8379,38 +8379,10 @@
               <a:buNone/>
             </a:pPr>
             <a:r>
-              <a:rPr lang="en"/>
+              <a:rPr lang="en" dirty="0"/>
               <a:t>Based on GitOps Principles and Platform engineering</a:t>
             </a:r>
-            <a:endParaRPr/>
-          </a:p>
-          <a:p>
-            <a:pPr marL="0" lvl="0" indent="0" algn="l" rtl="0">
-              <a:spcBef>
-                <a:spcPts val="0"/>
-              </a:spcBef>
-              <a:spcAft>
-                <a:spcPts val="0"/>
-              </a:spcAft>
-              <a:buNone/>
-            </a:pPr>
-            <a:endParaRPr/>
-          </a:p>
-          <a:p>
-            <a:pPr marL="0" lvl="0" indent="0" algn="l" rtl="0">
-              <a:spcBef>
-                <a:spcPts val="0"/>
-              </a:spcBef>
-              <a:spcAft>
-                <a:spcPts val="0"/>
-              </a:spcAft>
-              <a:buNone/>
-            </a:pPr>
-            <a:r>
-              <a:rPr lang="en"/>
-              <a:t>Mojtaba Imani</a:t>
-            </a:r>
-            <a:endParaRPr/>
+            <a:endParaRPr dirty="0"/>
           </a:p>
         </p:txBody>
       </p:sp>
@@ -8548,7 +8520,7 @@
         <p:spPr/>
         <p:txBody>
           <a:bodyPr>
-            <a:normAutofit fontScale="92500" lnSpcReduction="10000"/>
+            <a:normAutofit lnSpcReduction="10000"/>
           </a:bodyPr>
           <a:lstStyle/>
           <a:p>
@@ -8629,24 +8601,15 @@
           </a:p>
           <a:p>
             <a:r>
-              <a:rPr lang="en-US"/>
+              <a:rPr lang="en-US" dirty="0"/>
               <a:t>Finding the first client </a:t>
             </a:r>
+          </a:p>
+          <a:p>
+            <a:pPr marL="114300" indent="0">
+              <a:buNone/>
+            </a:pPr>
             <a:endParaRPr lang="en-US" dirty="0"/>
-          </a:p>
-          <a:p>
-            <a:r>
-              <a:rPr lang="en-US" dirty="0"/>
-              <a:t>(remove: backstage, </a:t>
-            </a:r>
-            <a:r>
-              <a:rPr lang="en-US" dirty="0" err="1"/>
-              <a:t>Postgresql</a:t>
-            </a:r>
-            <a:r>
-              <a:rPr lang="en-US" dirty="0"/>
-              <a:t>, )</a:t>
-            </a:r>
           </a:p>
         </p:txBody>
       </p:sp>

</xml_diff>